<commit_message>
1. verzió - draft
</commit_message>
<xml_diff>
--- a/13-IoT_adatok_feldolgozasa-BI/microsoft_AI_13.pptx
+++ b/13-IoT_adatok_feldolgozasa-BI/microsoft_AI_13.pptx
@@ -19128,11 +19128,15 @@
             </a:r>
             <a:r>
               <a:rPr lang="hu-HU" dirty="0" err="1"/>
-              <a:t>PowerBI</a:t>
+              <a:t>Power</a:t>
+            </a:r>
+            <a:r>
+              <a:rPr lang="hu-HU"/>
+              <a:t> BI </a:t>
             </a:r>
             <a:r>
               <a:rPr lang="hu-HU" dirty="0"/>
-              <a:t> integráció</a:t>
+              <a:t>integráció</a:t>
             </a:r>
           </a:p>
         </p:txBody>

</xml_diff>